<commit_message>
Atualização dos horários das aulas.
</commit_message>
<xml_diff>
--- a/DM119/slides/A_Apresentacao_Curso.pptx
+++ b/DM119/slides/A_Apresentacao_Curso.pptx
@@ -6078,7 +6078,25 @@
                 </a:solidFill>
                 <a:latin typeface="Arial" panose="020B0604020202020204"/>
               </a:rPr>
-              <a:t>Para os seminários, escolher 5 assuntos entre:</a:t>
+              <a:t>Para os seminários, escolher 5 assuntos entre</a:t>
+            </a:r>
+            <a:r>
+              <a:rPr lang="pt-PT" altLang="pt-BR" sz="2700" b="0" strike="noStrike" spc="-1">
+                <a:solidFill>
+                  <a:srgbClr val="000099"/>
+                </a:solidFill>
+                <a:latin typeface="Arial" panose="020B0604020202020204"/>
+              </a:rPr>
+              <a:t> (sugestão)</a:t>
+            </a:r>
+            <a:r>
+              <a:rPr lang="pt-BR" sz="2700" b="0" strike="noStrike" spc="-1">
+                <a:solidFill>
+                  <a:srgbClr val="000099"/>
+                </a:solidFill>
+                <a:latin typeface="Arial" panose="020B0604020202020204"/>
+              </a:rPr>
+              <a:t>:</a:t>
             </a:r>
             <a:endParaRPr lang="pt-BR" sz="2700" b="0" strike="noStrike" spc="-1">
               <a:solidFill>
@@ -6409,7 +6427,43 @@
                 </a:solidFill>
                 <a:latin typeface="Arial" panose="020B0604020202020204"/>
               </a:rPr>
-              <a:t>8:30h – 12:30h.</a:t>
+              <a:t>8:</a:t>
+            </a:r>
+            <a:r>
+              <a:rPr lang="pt-PT" altLang="pt-BR" sz="3000" b="0" strike="noStrike" spc="-1">
+                <a:solidFill>
+                  <a:srgbClr val="404040"/>
+                </a:solidFill>
+                <a:latin typeface="Arial" panose="020B0604020202020204"/>
+              </a:rPr>
+              <a:t>00</a:t>
+            </a:r>
+            <a:r>
+              <a:rPr lang="pt-BR" sz="3000" b="0" strike="noStrike" spc="-1">
+                <a:solidFill>
+                  <a:srgbClr val="404040"/>
+                </a:solidFill>
+                <a:latin typeface="Arial" panose="020B0604020202020204"/>
+              </a:rPr>
+              <a:t>h – 12:</a:t>
+            </a:r>
+            <a:r>
+              <a:rPr lang="pt-PT" altLang="pt-BR" sz="3000" b="0" strike="noStrike" spc="-1">
+                <a:solidFill>
+                  <a:srgbClr val="404040"/>
+                </a:solidFill>
+                <a:latin typeface="Arial" panose="020B0604020202020204"/>
+              </a:rPr>
+              <a:t>00</a:t>
+            </a:r>
+            <a:r>
+              <a:rPr lang="pt-BR" sz="3000" b="0" strike="noStrike" spc="-1">
+                <a:solidFill>
+                  <a:srgbClr val="404040"/>
+                </a:solidFill>
+                <a:latin typeface="Arial" panose="020B0604020202020204"/>
+              </a:rPr>
+              <a:t>h.</a:t>
             </a:r>
             <a:endParaRPr lang="pt-BR" sz="3000" b="0" strike="noStrike" spc="-1">
               <a:solidFill>
@@ -6444,7 +6498,43 @@
                 </a:solidFill>
                 <a:latin typeface="Arial" panose="020B0604020202020204"/>
               </a:rPr>
-              <a:t>13:30 – 17:30h</a:t>
+              <a:t>13:</a:t>
+            </a:r>
+            <a:r>
+              <a:rPr lang="pt-PT" altLang="pt-BR" sz="3000" b="0" strike="noStrike" spc="-1">
+                <a:solidFill>
+                  <a:srgbClr val="404040"/>
+                </a:solidFill>
+                <a:latin typeface="Arial" panose="020B0604020202020204"/>
+              </a:rPr>
+              <a:t>00</a:t>
+            </a:r>
+            <a:r>
+              <a:rPr lang="pt-BR" sz="3000" b="0" strike="noStrike" spc="-1">
+                <a:solidFill>
+                  <a:srgbClr val="404040"/>
+                </a:solidFill>
+                <a:latin typeface="Arial" panose="020B0604020202020204"/>
+              </a:rPr>
+              <a:t> – 17:</a:t>
+            </a:r>
+            <a:r>
+              <a:rPr lang="pt-PT" altLang="pt-BR" sz="3000" b="0" strike="noStrike" spc="-1">
+                <a:solidFill>
+                  <a:srgbClr val="404040"/>
+                </a:solidFill>
+                <a:latin typeface="Arial" panose="020B0604020202020204"/>
+              </a:rPr>
+              <a:t>00</a:t>
+            </a:r>
+            <a:r>
+              <a:rPr lang="pt-BR" sz="3000" b="0" strike="noStrike" spc="-1">
+                <a:solidFill>
+                  <a:srgbClr val="404040"/>
+                </a:solidFill>
+                <a:latin typeface="Arial" panose="020B0604020202020204"/>
+              </a:rPr>
+              <a:t>h</a:t>
             </a:r>
             <a:endParaRPr lang="pt-BR" sz="3000" b="0" strike="noStrike" spc="-1">
               <a:solidFill>

</xml_diff>